<commit_message>
single vehicle validation data
</commit_message>
<xml_diff>
--- a/projects/validation - single vehicle motion/reports/Pycrash Results 15 mph steer.pptx
+++ b/projects/validation - single vehicle motion/reports/Pycrash Results 15 mph steer.pptx
@@ -130,7 +130,6 @@
 <file path=ppt/revisionInfo.xml><?xml version="1.0" encoding="utf-8"?>
 <p1510:revInfo xmlns:a="http://schemas.openxmlformats.org/drawingml/2006/main" xmlns:r="http://schemas.openxmlformats.org/officeDocument/2006/relationships" xmlns:p1510="http://schemas.microsoft.com/office/powerpoint/2015/10/main">
   <p1510:revLst>
-    <p1510:client id="{D419296E-E52F-475F-910A-631D93E10A93}" v="642" dt="2020-10-06T01:10:00.524"/>
     <p1510:client id="{D45B304D-D94D-49D7-AF86-D7FAD3CC5128}" v="7" dt="2020-10-03T14:31:56.675"/>
   </p1510:revLst>
 </p1510:revInfo>
@@ -141,7 +140,7 @@
   <pc:docChgLst>
     <pc:chgData name="Joseph Cormier" userId="260f1994eb51c2be" providerId="LiveId" clId="{D45B304D-D94D-49D7-AF86-D7FAD3CC5128}"/>
     <pc:docChg chg="custSel addSld modSld sldOrd">
-      <pc:chgData name="Joseph Cormier" userId="260f1994eb51c2be" providerId="LiveId" clId="{D45B304D-D94D-49D7-AF86-D7FAD3CC5128}" dt="2020-10-03T14:31:56.675" v="63"/>
+      <pc:chgData name="Joseph Cormier" userId="260f1994eb51c2be" providerId="LiveId" clId="{D45B304D-D94D-49D7-AF86-D7FAD3CC5128}" dt="2020-10-09T15:09:56.690" v="79" actId="1076"/>
       <pc:docMkLst>
         <pc:docMk/>
       </pc:docMkLst>
@@ -229,18 +228,26 @@
           </ac:picMkLst>
         </pc:picChg>
       </pc:sldChg>
-      <pc:sldChg chg="addSp new">
-        <pc:chgData name="Joseph Cormier" userId="260f1994eb51c2be" providerId="LiveId" clId="{D45B304D-D94D-49D7-AF86-D7FAD3CC5128}" dt="2020-10-03T14:21:00.837" v="57"/>
+      <pc:sldChg chg="addSp modSp new mod">
+        <pc:chgData name="Joseph Cormier" userId="260f1994eb51c2be" providerId="LiveId" clId="{D45B304D-D94D-49D7-AF86-D7FAD3CC5128}" dt="2020-10-09T15:04:32.730" v="78" actId="1076"/>
         <pc:sldMkLst>
           <pc:docMk/>
           <pc:sldMk cId="689263968" sldId="260"/>
         </pc:sldMkLst>
-        <pc:picChg chg="add">
-          <ac:chgData name="Joseph Cormier" userId="260f1994eb51c2be" providerId="LiveId" clId="{D45B304D-D94D-49D7-AF86-D7FAD3CC5128}" dt="2020-10-03T14:21:00.837" v="57"/>
+        <pc:picChg chg="add mod">
+          <ac:chgData name="Joseph Cormier" userId="260f1994eb51c2be" providerId="LiveId" clId="{D45B304D-D94D-49D7-AF86-D7FAD3CC5128}" dt="2020-10-09T15:04:30.372" v="77" actId="1076"/>
           <ac:picMkLst>
             <pc:docMk/>
             <pc:sldMk cId="689263968" sldId="260"/>
             <ac:picMk id="2" creationId="{E3568E1D-5CAE-474B-993F-377658698C29}"/>
+          </ac:picMkLst>
+        </pc:picChg>
+        <pc:picChg chg="add mod">
+          <ac:chgData name="Joseph Cormier" userId="260f1994eb51c2be" providerId="LiveId" clId="{D45B304D-D94D-49D7-AF86-D7FAD3CC5128}" dt="2020-10-09T15:04:32.730" v="78" actId="1076"/>
+          <ac:picMkLst>
+            <pc:docMk/>
+            <pc:sldMk cId="689263968" sldId="260"/>
+            <ac:picMk id="4" creationId="{63DB4745-F8DD-4BBE-9D7B-281525D51AE4}"/>
           </ac:picMkLst>
         </pc:picChg>
       </pc:sldChg>
@@ -288,6 +295,21 @@
             <ac:picMk id="2" creationId="{839F71BC-B74E-4D7A-89E1-B1F3C443601C}"/>
           </ac:picMkLst>
         </pc:picChg>
+      </pc:sldChg>
+      <pc:sldChg chg="modSp mod">
+        <pc:chgData name="Joseph Cormier" userId="260f1994eb51c2be" providerId="LiveId" clId="{D45B304D-D94D-49D7-AF86-D7FAD3CC5128}" dt="2020-10-09T15:09:56.690" v="79" actId="1076"/>
+        <pc:sldMkLst>
+          <pc:docMk/>
+          <pc:sldMk cId="784343645" sldId="271"/>
+        </pc:sldMkLst>
+        <pc:spChg chg="mod">
+          <ac:chgData name="Joseph Cormier" userId="260f1994eb51c2be" providerId="LiveId" clId="{D45B304D-D94D-49D7-AF86-D7FAD3CC5128}" dt="2020-10-09T15:09:56.690" v="79" actId="1076"/>
+          <ac:spMkLst>
+            <pc:docMk/>
+            <pc:sldMk cId="784343645" sldId="271"/>
+            <ac:spMk id="9" creationId="{B18A78E7-9C04-49B6-80EC-A3513373376B}"/>
+          </ac:spMkLst>
+        </pc:spChg>
       </pc:sldChg>
     </pc:docChg>
   </pc:docChgLst>
@@ -807,7 +829,7 @@
           <a:p>
             <a:fld id="{03870C9C-E5D7-4B45-9496-E42E40903DD1}" type="datetimeFigureOut">
               <a:rPr lang="en-US" smtClean="0"/>
-              <a:t>10/5/2020</a:t>
+              <a:t>10/9/2020</a:t>
             </a:fld>
             <a:endParaRPr lang="en-US"/>
           </a:p>
@@ -1005,7 +1027,7 @@
           <a:p>
             <a:fld id="{03870C9C-E5D7-4B45-9496-E42E40903DD1}" type="datetimeFigureOut">
               <a:rPr lang="en-US" smtClean="0"/>
-              <a:t>10/5/2020</a:t>
+              <a:t>10/9/2020</a:t>
             </a:fld>
             <a:endParaRPr lang="en-US"/>
           </a:p>
@@ -1213,7 +1235,7 @@
           <a:p>
             <a:fld id="{03870C9C-E5D7-4B45-9496-E42E40903DD1}" type="datetimeFigureOut">
               <a:rPr lang="en-US" smtClean="0"/>
-              <a:t>10/5/2020</a:t>
+              <a:t>10/9/2020</a:t>
             </a:fld>
             <a:endParaRPr lang="en-US"/>
           </a:p>
@@ -1411,7 +1433,7 @@
           <a:p>
             <a:fld id="{03870C9C-E5D7-4B45-9496-E42E40903DD1}" type="datetimeFigureOut">
               <a:rPr lang="en-US" smtClean="0"/>
-              <a:t>10/5/2020</a:t>
+              <a:t>10/9/2020</a:t>
             </a:fld>
             <a:endParaRPr lang="en-US"/>
           </a:p>
@@ -1686,7 +1708,7 @@
           <a:p>
             <a:fld id="{03870C9C-E5D7-4B45-9496-E42E40903DD1}" type="datetimeFigureOut">
               <a:rPr lang="en-US" smtClean="0"/>
-              <a:t>10/5/2020</a:t>
+              <a:t>10/9/2020</a:t>
             </a:fld>
             <a:endParaRPr lang="en-US"/>
           </a:p>
@@ -1951,7 +1973,7 @@
           <a:p>
             <a:fld id="{03870C9C-E5D7-4B45-9496-E42E40903DD1}" type="datetimeFigureOut">
               <a:rPr lang="en-US" smtClean="0"/>
-              <a:t>10/5/2020</a:t>
+              <a:t>10/9/2020</a:t>
             </a:fld>
             <a:endParaRPr lang="en-US"/>
           </a:p>
@@ -2363,7 +2385,7 @@
           <a:p>
             <a:fld id="{03870C9C-E5D7-4B45-9496-E42E40903DD1}" type="datetimeFigureOut">
               <a:rPr lang="en-US" smtClean="0"/>
-              <a:t>10/5/2020</a:t>
+              <a:t>10/9/2020</a:t>
             </a:fld>
             <a:endParaRPr lang="en-US"/>
           </a:p>
@@ -2504,7 +2526,7 @@
           <a:p>
             <a:fld id="{03870C9C-E5D7-4B45-9496-E42E40903DD1}" type="datetimeFigureOut">
               <a:rPr lang="en-US" smtClean="0"/>
-              <a:t>10/5/2020</a:t>
+              <a:t>10/9/2020</a:t>
             </a:fld>
             <a:endParaRPr lang="en-US"/>
           </a:p>
@@ -2617,7 +2639,7 @@
           <a:p>
             <a:fld id="{03870C9C-E5D7-4B45-9496-E42E40903DD1}" type="datetimeFigureOut">
               <a:rPr lang="en-US" smtClean="0"/>
-              <a:t>10/5/2020</a:t>
+              <a:t>10/9/2020</a:t>
             </a:fld>
             <a:endParaRPr lang="en-US"/>
           </a:p>
@@ -2928,7 +2950,7 @@
           <a:p>
             <a:fld id="{03870C9C-E5D7-4B45-9496-E42E40903DD1}" type="datetimeFigureOut">
               <a:rPr lang="en-US" smtClean="0"/>
-              <a:t>10/5/2020</a:t>
+              <a:t>10/9/2020</a:t>
             </a:fld>
             <a:endParaRPr lang="en-US"/>
           </a:p>
@@ -3216,7 +3238,7 @@
           <a:p>
             <a:fld id="{03870C9C-E5D7-4B45-9496-E42E40903DD1}" type="datetimeFigureOut">
               <a:rPr lang="en-US" smtClean="0"/>
-              <a:t>10/5/2020</a:t>
+              <a:t>10/9/2020</a:t>
             </a:fld>
             <a:endParaRPr lang="en-US"/>
           </a:p>
@@ -3457,7 +3479,7 @@
           <a:p>
             <a:fld id="{03870C9C-E5D7-4B45-9496-E42E40903DD1}" type="datetimeFigureOut">
               <a:rPr lang="en-US" smtClean="0"/>
-              <a:t>10/5/2020</a:t>
+              <a:t>10/9/2020</a:t>
             </a:fld>
             <a:endParaRPr lang="en-US"/>
           </a:p>
@@ -4589,7 +4611,7 @@
           <a:p>
             <a:pPr algn="ctr"/>
             <a:r>
-              <a:rPr lang="en-US"/>
+              <a:rPr lang="en-US" dirty="0"/>
               <a:t>mu max (0.76)</a:t>
             </a:r>
           </a:p>
@@ -4664,7 +4686,7 @@
           <a:p>
             <a:pPr algn="ctr"/>
             <a:r>
-              <a:rPr lang="en-US"/>
+              <a:rPr lang="en-US" dirty="0"/>
               <a:t>alpha max (max slip angle x mu max)</a:t>
             </a:r>
           </a:p>
@@ -4762,7 +4784,7 @@
         </p:nvSpPr>
         <p:spPr>
           <a:xfrm>
-            <a:off x="4584548" y="4082596"/>
+            <a:off x="4655607" y="3939721"/>
             <a:ext cx="2743199" cy="369332"/>
           </a:xfrm>
           <a:prstGeom prst="rect">
@@ -4780,7 +4802,7 @@
           <a:lstStyle/>
           <a:p>
             <a:r>
-              <a:rPr lang="en-US"/>
+              <a:rPr lang="en-US" dirty="0"/>
               <a:t>max slip angle = 10 degrees</a:t>
             </a:r>
           </a:p>
@@ -5051,8 +5073,38 @@
         </p:blipFill>
         <p:spPr>
           <a:xfrm>
-            <a:off x="3196941" y="607121"/>
-            <a:ext cx="6145045" cy="5916342"/>
+            <a:off x="151394" y="458017"/>
+            <a:ext cx="5944606" cy="5723363"/>
+          </a:xfrm>
+          <a:prstGeom prst="rect">
+            <a:avLst/>
+          </a:prstGeom>
+        </p:spPr>
+      </p:pic>
+      <p:pic>
+        <p:nvPicPr>
+          <p:cNvPr id="4" name="Picture 3">
+            <a:extLst>
+              <a:ext uri="{FF2B5EF4-FFF2-40B4-BE49-F238E27FC236}">
+                <a16:creationId xmlns:a16="http://schemas.microsoft.com/office/drawing/2014/main" id="{63DB4745-F8DD-4BBE-9D7B-281525D51AE4}"/>
+              </a:ext>
+            </a:extLst>
+          </p:cNvPr>
+          <p:cNvPicPr>
+            <a:picLocks noChangeAspect="1"/>
+          </p:cNvPicPr>
+          <p:nvPr/>
+        </p:nvPicPr>
+        <p:blipFill>
+          <a:blip r:embed="rId3"/>
+          <a:stretch>
+            <a:fillRect/>
+          </a:stretch>
+        </p:blipFill>
+        <p:spPr>
+          <a:xfrm>
+            <a:off x="6096000" y="500470"/>
+            <a:ext cx="6058102" cy="5857059"/>
           </a:xfrm>
           <a:prstGeom prst="rect">
             <a:avLst/>
@@ -5321,7 +5373,7 @@
           <a:lstStyle/>
           <a:p>
             <a:r>
-              <a:rPr lang="en-US">
+              <a:rPr lang="en-US" dirty="0">
                 <a:ea typeface="+mn-lt"/>
                 <a:cs typeface="+mn-lt"/>
               </a:rPr>
@@ -5330,20 +5382,20 @@
           </a:p>
           <a:p>
             <a:r>
-              <a:rPr lang="en-US" err="1">
+              <a:rPr lang="en-US" dirty="0" err="1">
                 <a:ea typeface="+mn-lt"/>
                 <a:cs typeface="+mn-lt"/>
               </a:rPr>
               <a:t>Pycrash</a:t>
             </a:r>
             <a:r>
-              <a:rPr lang="en-US">
+              <a:rPr lang="en-US" dirty="0">
                 <a:ea typeface="+mn-lt"/>
                 <a:cs typeface="+mn-lt"/>
               </a:rPr>
               <a:t> CG height = 0</a:t>
             </a:r>
-            <a:endParaRPr lang="en-US"/>
+            <a:endParaRPr lang="en-US" dirty="0"/>
           </a:p>
         </p:txBody>
       </p:sp>

</xml_diff>